<commit_message>
Guided Capstone Presentation - for the Executive Team
Guided Capstone Presentation - for the Executive Team
</commit_message>
<xml_diff>
--- a/Guided Capstone Presentation - for the Executive Team.pptx
+++ b/Guided Capstone Presentation - for the Executive Team.pptx
@@ -131,7 +131,7 @@
   <pc:docChgLst>
     <pc:chgData name="Neelam Pandey" userId="2ae105414b09a5f5" providerId="LiveId" clId="{4F646F29-D351-43D5-BEB6-1C4463294515}"/>
     <pc:docChg chg="custSel addSld delSld modSld">
-      <pc:chgData name="Neelam Pandey" userId="2ae105414b09a5f5" providerId="LiveId" clId="{4F646F29-D351-43D5-BEB6-1C4463294515}" dt="2025-08-14T16:17:57.629" v="352" actId="20577"/>
+      <pc:chgData name="Neelam Pandey" userId="2ae105414b09a5f5" providerId="LiveId" clId="{4F646F29-D351-43D5-BEB6-1C4463294515}" dt="2025-08-14T16:26:49.848" v="437" actId="27636"/>
       <pc:docMkLst>
         <pc:docMk/>
       </pc:docMkLst>
@@ -207,7 +207,7 @@
         </pc:spChg>
       </pc:sldChg>
       <pc:sldChg chg="addSp modSp new mod setBg">
-        <pc:chgData name="Neelam Pandey" userId="2ae105414b09a5f5" providerId="LiveId" clId="{4F646F29-D351-43D5-BEB6-1C4463294515}" dt="2025-08-14T15:50:00.437" v="117" actId="14100"/>
+        <pc:chgData name="Neelam Pandey" userId="2ae105414b09a5f5" providerId="LiveId" clId="{4F646F29-D351-43D5-BEB6-1C4463294515}" dt="2025-08-14T16:26:49.848" v="437" actId="27636"/>
         <pc:sldMkLst>
           <pc:docMk/>
           <pc:sldMk cId="1810659090" sldId="257"/>
@@ -221,7 +221,7 @@
           </ac:spMkLst>
         </pc:spChg>
         <pc:spChg chg="mod">
-          <ac:chgData name="Neelam Pandey" userId="2ae105414b09a5f5" providerId="LiveId" clId="{4F646F29-D351-43D5-BEB6-1C4463294515}" dt="2025-08-14T15:50:00.437" v="117" actId="14100"/>
+          <ac:chgData name="Neelam Pandey" userId="2ae105414b09a5f5" providerId="LiveId" clId="{4F646F29-D351-43D5-BEB6-1C4463294515}" dt="2025-08-14T16:26:49.848" v="437" actId="27636"/>
           <ac:spMkLst>
             <pc:docMk/>
             <pc:sldMk cId="1810659090" sldId="257"/>
@@ -286,7 +286,7 @@
         </pc:spChg>
       </pc:sldChg>
       <pc:sldChg chg="addSp modSp new mod setBg">
-        <pc:chgData name="Neelam Pandey" userId="2ae105414b09a5f5" providerId="LiveId" clId="{4F646F29-D351-43D5-BEB6-1C4463294515}" dt="2025-08-14T16:04:35.245" v="123" actId="20577"/>
+        <pc:chgData name="Neelam Pandey" userId="2ae105414b09a5f5" providerId="LiveId" clId="{4F646F29-D351-43D5-BEB6-1C4463294515}" dt="2025-08-14T16:26:39.428" v="435" actId="2711"/>
         <pc:sldMkLst>
           <pc:docMk/>
           <pc:sldMk cId="2917104076" sldId="258"/>
@@ -300,7 +300,7 @@
           </ac:spMkLst>
         </pc:spChg>
         <pc:spChg chg="mod">
-          <ac:chgData name="Neelam Pandey" userId="2ae105414b09a5f5" providerId="LiveId" clId="{4F646F29-D351-43D5-BEB6-1C4463294515}" dt="2025-08-14T16:04:35.245" v="123" actId="20577"/>
+          <ac:chgData name="Neelam Pandey" userId="2ae105414b09a5f5" providerId="LiveId" clId="{4F646F29-D351-43D5-BEB6-1C4463294515}" dt="2025-08-14T16:26:39.428" v="435" actId="2711"/>
           <ac:spMkLst>
             <pc:docMk/>
             <pc:sldMk cId="2917104076" sldId="258"/>
@@ -426,7 +426,7 @@
         </pc:sldMkLst>
       </pc:sldChg>
       <pc:sldChg chg="addSp modSp new mod setBg">
-        <pc:chgData name="Neelam Pandey" userId="2ae105414b09a5f5" providerId="LiveId" clId="{4F646F29-D351-43D5-BEB6-1C4463294515}" dt="2025-08-14T16:17:57.629" v="352" actId="20577"/>
+        <pc:chgData name="Neelam Pandey" userId="2ae105414b09a5f5" providerId="LiveId" clId="{4F646F29-D351-43D5-BEB6-1C4463294515}" dt="2025-08-14T16:25:35.459" v="431" actId="20577"/>
         <pc:sldMkLst>
           <pc:docMk/>
           <pc:sldMk cId="2066494654" sldId="262"/>
@@ -440,7 +440,7 @@
           </ac:spMkLst>
         </pc:spChg>
         <pc:spChg chg="mod">
-          <ac:chgData name="Neelam Pandey" userId="2ae105414b09a5f5" providerId="LiveId" clId="{4F646F29-D351-43D5-BEB6-1C4463294515}" dt="2025-08-14T16:17:57.629" v="352" actId="20577"/>
+          <ac:chgData name="Neelam Pandey" userId="2ae105414b09a5f5" providerId="LiveId" clId="{4F646F29-D351-43D5-BEB6-1C4463294515}" dt="2025-08-14T16:25:35.459" v="431" actId="20577"/>
           <ac:spMkLst>
             <pc:docMk/>
             <pc:sldMk cId="2066494654" sldId="262"/>
@@ -495,21 +495,29 @@
           <pc:sldMk cId="27691181" sldId="263"/>
         </pc:sldMkLst>
       </pc:sldChg>
-      <pc:sldChg chg="add">
-        <pc:chgData name="Neelam Pandey" userId="2ae105414b09a5f5" providerId="LiveId" clId="{4F646F29-D351-43D5-BEB6-1C4463294515}" dt="2025-08-14T16:07:12.473" v="130" actId="2890"/>
+      <pc:sldChg chg="modSp add mod">
+        <pc:chgData name="Neelam Pandey" userId="2ae105414b09a5f5" providerId="LiveId" clId="{4F646F29-D351-43D5-BEB6-1C4463294515}" dt="2025-08-14T16:24:36.620" v="378" actId="255"/>
         <pc:sldMkLst>
           <pc:docMk/>
           <pc:sldMk cId="2874533776" sldId="263"/>
         </pc:sldMkLst>
+        <pc:spChg chg="mod">
+          <ac:chgData name="Neelam Pandey" userId="2ae105414b09a5f5" providerId="LiveId" clId="{4F646F29-D351-43D5-BEB6-1C4463294515}" dt="2025-08-14T16:24:36.620" v="378" actId="255"/>
+          <ac:spMkLst>
+            <pc:docMk/>
+            <pc:sldMk cId="2874533776" sldId="263"/>
+            <ac:spMk id="3" creationId="{0A1DEB9E-5FBE-9AD9-F5E9-56443C606FC3}"/>
+          </ac:spMkLst>
+        </pc:spChg>
       </pc:sldChg>
       <pc:sldChg chg="modSp add mod">
-        <pc:chgData name="Neelam Pandey" userId="2ae105414b09a5f5" providerId="LiveId" clId="{4F646F29-D351-43D5-BEB6-1C4463294515}" dt="2025-08-14T16:13:33.568" v="220" actId="20577"/>
+        <pc:chgData name="Neelam Pandey" userId="2ae105414b09a5f5" providerId="LiveId" clId="{4F646F29-D351-43D5-BEB6-1C4463294515}" dt="2025-08-14T16:24:50.087" v="379" actId="255"/>
         <pc:sldMkLst>
           <pc:docMk/>
           <pc:sldMk cId="4085223227" sldId="264"/>
         </pc:sldMkLst>
         <pc:spChg chg="mod">
-          <ac:chgData name="Neelam Pandey" userId="2ae105414b09a5f5" providerId="LiveId" clId="{4F646F29-D351-43D5-BEB6-1C4463294515}" dt="2025-08-14T16:13:33.568" v="220" actId="20577"/>
+          <ac:chgData name="Neelam Pandey" userId="2ae105414b09a5f5" providerId="LiveId" clId="{4F646F29-D351-43D5-BEB6-1C4463294515}" dt="2025-08-14T16:24:50.087" v="379" actId="255"/>
           <ac:spMkLst>
             <pc:docMk/>
             <pc:sldMk cId="4085223227" sldId="264"/>
@@ -4349,7 +4357,6 @@
               <a:rPr lang="en-US" dirty="0"/>
               <a:t>Big Mountain Resort Ticket price and cost management</a:t>
             </a:r>
-            <a:endParaRPr lang="en-US"/>
           </a:p>
         </p:txBody>
       </p:sp>
@@ -5251,22 +5258,48 @@
         </p:nvSpPr>
         <p:spPr>
           <a:xfrm>
-            <a:off x="4810259" y="10138"/>
-            <a:ext cx="6555347" cy="6185389"/>
+            <a:off x="4810259" y="811370"/>
+            <a:ext cx="6523149" cy="5384158"/>
           </a:xfrm>
         </p:spPr>
         <p:txBody>
           <a:bodyPr anchor="ctr">
-            <a:normAutofit/>
+            <a:normAutofit fontScale="92500" lnSpcReduction="10000"/>
           </a:bodyPr>
           <a:lstStyle/>
           <a:p>
             <a:pPr marL="0" indent="0">
               <a:buNone/>
             </a:pPr>
-            <a:r>
-              <a:rPr lang="en-US" sz="2000" dirty="0">
-                <a:latin typeface="Arial" panose="020B0604020202020204" pitchFamily="34" charset="0"/>
+            <a:endParaRPr lang="en-US" sz="2000" dirty="0">
+              <a:latin typeface="Arial" panose="020B0604020202020204" pitchFamily="34" charset="0"/>
+              <a:cs typeface="Arial" panose="020B0604020202020204" pitchFamily="34" charset="0"/>
+            </a:endParaRPr>
+          </a:p>
+          <a:p>
+            <a:pPr marL="0" indent="0">
+              <a:buNone/>
+            </a:pPr>
+            <a:endParaRPr lang="en-US" sz="2000" dirty="0">
+              <a:latin typeface="Arial" panose="020B0604020202020204" pitchFamily="34" charset="0"/>
+              <a:cs typeface="Arial" panose="020B0604020202020204" pitchFamily="34" charset="0"/>
+            </a:endParaRPr>
+          </a:p>
+          <a:p>
+            <a:pPr marL="0" indent="0">
+              <a:buNone/>
+            </a:pPr>
+            <a:endParaRPr lang="en-US" sz="2000" dirty="0">
+              <a:latin typeface="Arial" panose="020B0604020202020204" pitchFamily="34" charset="0"/>
+              <a:cs typeface="Arial" panose="020B0604020202020204" pitchFamily="34" charset="0"/>
+            </a:endParaRPr>
+          </a:p>
+          <a:p>
+            <a:pPr marL="0" indent="0">
+              <a:buNone/>
+            </a:pPr>
+            <a:r>
+              <a:rPr lang="en-US" sz="2200" dirty="0">
                 <a:cs typeface="Arial" panose="020B0604020202020204" pitchFamily="34" charset="0"/>
               </a:rPr>
               <a:t>Big Mountain Resort is located in Montana and serves around 350,000 visitors annually. ​The resort has 105 trails and 11 lifts, with a new lift increasing operating costs by $1,540,000.The pricing strategy is premium, but there are concerns about not maximizing facility usage. ​</a:t>
@@ -5274,8 +5307,7 @@
           </a:p>
           <a:p>
             <a:r>
-              <a:rPr lang="en-US" sz="2000" dirty="0">
-                <a:latin typeface="Arial" panose="020B0604020202020204" pitchFamily="34" charset="0"/>
+              <a:rPr lang="en-US" sz="2200" dirty="0">
                 <a:cs typeface="Arial" panose="020B0604020202020204" pitchFamily="34" charset="0"/>
               </a:rPr>
               <a:t>The goal is to implement a data-driven strategy to improve ticket pricing and cost management.</a:t>
@@ -5283,8 +5315,7 @@
           </a:p>
           <a:p>
             <a:r>
-              <a:rPr lang="en-US" sz="2000" i="0" u="none" strike="noStrike" cap="none" dirty="0">
-                <a:latin typeface="Arial" panose="020B0604020202020204" pitchFamily="34" charset="0"/>
+              <a:rPr lang="en-US" sz="2200" i="0" u="none" strike="noStrike" cap="none" dirty="0">
                 <a:ea typeface="Arial"/>
                 <a:cs typeface="Arial" panose="020B0604020202020204" pitchFamily="34" charset="0"/>
                 <a:sym typeface="Arial"/>
@@ -5295,8 +5326,7 @@
           <a:p>
             <a:pPr marL="285750" indent="-285750"/>
             <a:r>
-              <a:rPr lang="en-US" sz="2000" dirty="0">
-                <a:latin typeface="Arial" panose="020B0604020202020204" pitchFamily="34" charset="0"/>
+              <a:rPr lang="en-US" sz="2200" dirty="0">
                 <a:cs typeface="Arial" panose="020B0604020202020204" pitchFamily="34" charset="0"/>
               </a:rPr>
               <a:t>Single CSV file from the database manager  - provides ​important data columns including terrain parks, longest run, skiable terrain, snowmaking area, days open, years open, average snowfall, and ticket prices.</a:t>
@@ -5808,26 +5838,27 @@
           <a:lstStyle/>
           <a:p>
             <a:r>
-              <a:rPr lang="en-US" dirty="0"/>
-              <a:t>The random forest model has a lower cross-validation mean absolute error by</a:t>
-            </a:r>
-            <a:r>
-              <a:rPr lang="en-US" sz="2000" dirty="0"/>
-              <a:t> </a:t>
-            </a:r>
-            <a:r>
-              <a:rPr lang="en-US" dirty="0"/>
-              <a:t>almost $1. It also exhibits less variability. Verifying performance on the test set,</a:t>
-            </a:r>
-            <a:r>
-              <a:rPr lang="en-US" sz="2000" dirty="0"/>
-              <a:t> </a:t>
-            </a:r>
-            <a:r>
-              <a:rPr lang="en-US" dirty="0"/>
-              <a:t>produces performance consistent with the cross-validation results.</a:t>
-            </a:r>
-            <a:endParaRPr lang="en-US" sz="2000" dirty="0"/>
+              <a:rPr lang="en-US" sz="2000" dirty="0">
+                <a:cs typeface="Arial" panose="020B0604020202020204" pitchFamily="34" charset="0"/>
+              </a:rPr>
+              <a:t>The random forest model has a lower cross-validation mean absolute error by almost $1. </a:t>
+            </a:r>
+          </a:p>
+          <a:p>
+            <a:r>
+              <a:rPr lang="en-US" sz="2000" dirty="0">
+                <a:cs typeface="Arial" panose="020B0604020202020204" pitchFamily="34" charset="0"/>
+              </a:rPr>
+              <a:t>It also exhibits less variability. </a:t>
+            </a:r>
+          </a:p>
+          <a:p>
+            <a:r>
+              <a:rPr lang="en-US" sz="2000" dirty="0">
+                <a:cs typeface="Arial" panose="020B0604020202020204" pitchFamily="34" charset="0"/>
+              </a:rPr>
+              <a:t>Verifying performance on the test set, produces performance consistent with the cross-validation results.</a:t>
+            </a:r>
           </a:p>
         </p:txBody>
       </p:sp>
@@ -6839,7 +6870,7 @@
         </p:spPr>
         <p:txBody>
           <a:bodyPr anchor="ctr">
-            <a:normAutofit fontScale="92500" lnSpcReduction="10000"/>
+            <a:normAutofit/>
           </a:bodyPr>
           <a:lstStyle/>
           <a:p>
@@ -6847,31 +6878,31 @@
               <a:buNone/>
             </a:pPr>
             <a:r>
-              <a:rPr lang="en-US" dirty="0"/>
+              <a:rPr lang="en-US" sz="2000" dirty="0"/>
               <a:t>Here is valuable business intelligence of our model:</a:t>
             </a:r>
           </a:p>
           <a:p>
             <a:r>
-              <a:rPr lang="en-US" dirty="0"/>
+              <a:rPr lang="en-US" sz="2000" dirty="0"/>
               <a:t>Permanently closing down up to 10 of the least used runs. This doesn't impact any other resort statistics.</a:t>
             </a:r>
           </a:p>
           <a:p>
             <a:r>
-              <a:rPr lang="en-US" dirty="0"/>
+              <a:rPr lang="en-US" sz="2000" dirty="0"/>
               <a:t>Increase the vertical drop by adding a run to a point 150 feet lower down but requiring the installation of an additional chair lift to bring skiers back up, without additional snow making coverage</a:t>
             </a:r>
           </a:p>
           <a:p>
             <a:r>
-              <a:rPr lang="en-US" dirty="0"/>
+              <a:rPr lang="en-US" sz="2000" dirty="0"/>
               <a:t>Same as number 2, but adding 2 acres of snow making cover</a:t>
             </a:r>
           </a:p>
           <a:p>
             <a:r>
-              <a:rPr lang="en-US" dirty="0"/>
+              <a:rPr lang="en-US" sz="2000" dirty="0"/>
               <a:t>Increase the longest run by 0.2 mile to boast 3.5 miles length, requiring an additional snow making coverage of 4 acres.</a:t>
             </a:r>
           </a:p>
@@ -7368,16 +7399,15 @@
           <a:lstStyle/>
           <a:p>
             <a:r>
-              <a:rPr lang="en-US" dirty="0"/>
+              <a:rPr lang="en-US" sz="2000" dirty="0"/>
               <a:t>Big Mountain currently charge $81.00 for ticket.</a:t>
             </a:r>
           </a:p>
           <a:p>
             <a:r>
-              <a:rPr lang="en-US" dirty="0"/>
+              <a:rPr lang="en-US" sz="2000" dirty="0"/>
               <a:t>Big Mountain Resort modelled price is $90.50.</a:t>
             </a:r>
-            <a:endParaRPr lang="en-US" sz="2000" dirty="0"/>
           </a:p>
         </p:txBody>
       </p:sp>
@@ -7863,7 +7893,7 @@
           <a:lstStyle/>
           <a:p>
             <a:r>
-              <a:rPr lang="en-US" dirty="0"/>
+              <a:rPr lang="en-US" sz="2000" dirty="0"/>
               <a:t>Updated ticket price to $90.50 is proposed based on other resorts features comparison and ticket price variation to increase Big Mountain resort revenue.</a:t>
             </a:r>
           </a:p>
@@ -7871,23 +7901,23 @@
             <a:pPr marL="0" indent="0">
               <a:buNone/>
             </a:pPr>
-            <a:endParaRPr lang="en-US" sz="1600" dirty="0"/>
+            <a:endParaRPr lang="en-US" sz="2000" dirty="0"/>
           </a:p>
           <a:p>
             <a:pPr marL="0" indent="0">
               <a:buNone/>
             </a:pPr>
             <a:r>
-              <a:rPr lang="en-US" sz="1600" b="1" u="sng" dirty="0"/>
+              <a:rPr lang="en-US" sz="2000" b="1" u="sng" dirty="0"/>
               <a:t>Note</a:t>
             </a:r>
             <a:r>
-              <a:rPr lang="en-US" sz="1600" b="1" dirty="0"/>
+              <a:rPr lang="en-US" sz="2000" b="1" dirty="0"/>
               <a:t>: </a:t>
             </a:r>
             <a:r>
-              <a:rPr lang="en-US" sz="1600" dirty="0"/>
-              <a:t>We will provide detail of this model/Python code detail and can experiment themselves for newer future uses.</a:t>
+              <a:rPr lang="en-US" sz="2000" dirty="0"/>
+              <a:t>We will provide detail of this model/Python code detail to respective team for newer/future uses.</a:t>
             </a:r>
           </a:p>
         </p:txBody>

</xml_diff>